<commit_message>
moving towards the final
</commit_message>
<xml_diff>
--- a/teaching/expdes/deprecated/final.review.pptx
+++ b/teaching/expdes/deprecated/final.review.pptx
@@ -106,6 +106,11 @@
       </a:defRPr>
     </a:lvl9pPr>
   </p:defaultTextStyle>
+  <p:extLst>
+    <p:ext uri="{EFAFB233-063F-42B5-8137-9DF3F51BA10A}">
+      <p15:sldGuideLst xmlns:p15="http://schemas.microsoft.com/office/powerpoint/2012/main"/>
+    </p:ext>
+  </p:extLst>
 </p:presentation>
 </file>
 
@@ -151,10 +156,9 @@
           </a:lstStyle>
           <a:p>
             <a:r>
-              <a:rPr lang="en-US" smtClean="0"/>
+              <a:rPr lang="en-US"/>
               <a:t>Click to edit Master title style</a:t>
             </a:r>
-            <a:endParaRPr lang="en-US"/>
           </a:p>
         </p:txBody>
       </p:sp>
@@ -216,10 +220,9 @@
           </a:lstStyle>
           <a:p>
             <a:r>
-              <a:rPr lang="en-US" smtClean="0"/>
+              <a:rPr lang="en-US"/>
               <a:t>Click to edit Master subtitle style</a:t>
             </a:r>
-            <a:endParaRPr lang="en-US"/>
           </a:p>
         </p:txBody>
       </p:sp>
@@ -240,7 +243,7 @@
           <a:p>
             <a:fld id="{EE44A417-51B0-1D43-B02A-8AAFACC2C201}" type="datetimeFigureOut">
               <a:rPr lang="en-US" smtClean="0"/>
-              <a:t>4/24/18</a:t>
+              <a:t>4/21/20</a:t>
             </a:fld>
             <a:endParaRPr lang="en-US"/>
           </a:p>
@@ -334,10 +337,9 @@
           <a:lstStyle/>
           <a:p>
             <a:r>
-              <a:rPr lang="en-US" smtClean="0"/>
+              <a:rPr lang="en-US"/>
               <a:t>Click to edit Master title style</a:t>
             </a:r>
-            <a:endParaRPr lang="en-US"/>
           </a:p>
         </p:txBody>
       </p:sp>
@@ -358,38 +360,37 @@
           <a:p>
             <a:pPr lvl="0"/>
             <a:r>
-              <a:rPr lang="en-US" smtClean="0"/>
+              <a:rPr lang="en-US"/>
               <a:t>Click to edit Master text styles</a:t>
             </a:r>
           </a:p>
           <a:p>
             <a:pPr lvl="1"/>
             <a:r>
-              <a:rPr lang="en-US" smtClean="0"/>
+              <a:rPr lang="en-US"/>
               <a:t>Second level</a:t>
             </a:r>
           </a:p>
           <a:p>
             <a:pPr lvl="2"/>
             <a:r>
-              <a:rPr lang="en-US" smtClean="0"/>
+              <a:rPr lang="en-US"/>
               <a:t>Third level</a:t>
             </a:r>
           </a:p>
           <a:p>
             <a:pPr lvl="3"/>
             <a:r>
-              <a:rPr lang="en-US" smtClean="0"/>
+              <a:rPr lang="en-US"/>
               <a:t>Fourth level</a:t>
             </a:r>
           </a:p>
           <a:p>
             <a:pPr lvl="4"/>
             <a:r>
-              <a:rPr lang="en-US" smtClean="0"/>
+              <a:rPr lang="en-US"/>
               <a:t>Fifth level</a:t>
             </a:r>
-            <a:endParaRPr lang="en-US"/>
           </a:p>
         </p:txBody>
       </p:sp>
@@ -410,7 +411,7 @@
           <a:p>
             <a:fld id="{EE44A417-51B0-1D43-B02A-8AAFACC2C201}" type="datetimeFigureOut">
               <a:rPr lang="en-US" smtClean="0"/>
-              <a:t>4/24/18</a:t>
+              <a:t>4/21/20</a:t>
             </a:fld>
             <a:endParaRPr lang="en-US"/>
           </a:p>
@@ -509,10 +510,9 @@
           <a:lstStyle/>
           <a:p>
             <a:r>
-              <a:rPr lang="en-US" smtClean="0"/>
+              <a:rPr lang="en-US"/>
               <a:t>Click to edit Master title style</a:t>
             </a:r>
-            <a:endParaRPr lang="en-US"/>
           </a:p>
         </p:txBody>
       </p:sp>
@@ -538,38 +538,37 @@
           <a:p>
             <a:pPr lvl="0"/>
             <a:r>
-              <a:rPr lang="en-US" smtClean="0"/>
+              <a:rPr lang="en-US"/>
               <a:t>Click to edit Master text styles</a:t>
             </a:r>
           </a:p>
           <a:p>
             <a:pPr lvl="1"/>
             <a:r>
-              <a:rPr lang="en-US" smtClean="0"/>
+              <a:rPr lang="en-US"/>
               <a:t>Second level</a:t>
             </a:r>
           </a:p>
           <a:p>
             <a:pPr lvl="2"/>
             <a:r>
-              <a:rPr lang="en-US" smtClean="0"/>
+              <a:rPr lang="en-US"/>
               <a:t>Third level</a:t>
             </a:r>
           </a:p>
           <a:p>
             <a:pPr lvl="3"/>
             <a:r>
-              <a:rPr lang="en-US" smtClean="0"/>
+              <a:rPr lang="en-US"/>
               <a:t>Fourth level</a:t>
             </a:r>
           </a:p>
           <a:p>
             <a:pPr lvl="4"/>
             <a:r>
-              <a:rPr lang="en-US" smtClean="0"/>
+              <a:rPr lang="en-US"/>
               <a:t>Fifth level</a:t>
             </a:r>
-            <a:endParaRPr lang="en-US"/>
           </a:p>
         </p:txBody>
       </p:sp>
@@ -590,7 +589,7 @@
           <a:p>
             <a:fld id="{EE44A417-51B0-1D43-B02A-8AAFACC2C201}" type="datetimeFigureOut">
               <a:rPr lang="en-US" smtClean="0"/>
-              <a:t>4/24/18</a:t>
+              <a:t>4/21/20</a:t>
             </a:fld>
             <a:endParaRPr lang="en-US"/>
           </a:p>
@@ -684,10 +683,9 @@
           <a:lstStyle/>
           <a:p>
             <a:r>
-              <a:rPr lang="en-US" smtClean="0"/>
+              <a:rPr lang="en-US"/>
               <a:t>Click to edit Master title style</a:t>
             </a:r>
-            <a:endParaRPr lang="en-US"/>
           </a:p>
         </p:txBody>
       </p:sp>
@@ -708,38 +706,37 @@
           <a:p>
             <a:pPr lvl="0"/>
             <a:r>
-              <a:rPr lang="en-US" smtClean="0"/>
+              <a:rPr lang="en-US"/>
               <a:t>Click to edit Master text styles</a:t>
             </a:r>
           </a:p>
           <a:p>
             <a:pPr lvl="1"/>
             <a:r>
-              <a:rPr lang="en-US" smtClean="0"/>
+              <a:rPr lang="en-US"/>
               <a:t>Second level</a:t>
             </a:r>
           </a:p>
           <a:p>
             <a:pPr lvl="2"/>
             <a:r>
-              <a:rPr lang="en-US" smtClean="0"/>
+              <a:rPr lang="en-US"/>
               <a:t>Third level</a:t>
             </a:r>
           </a:p>
           <a:p>
             <a:pPr lvl="3"/>
             <a:r>
-              <a:rPr lang="en-US" smtClean="0"/>
+              <a:rPr lang="en-US"/>
               <a:t>Fourth level</a:t>
             </a:r>
           </a:p>
           <a:p>
             <a:pPr lvl="4"/>
             <a:r>
-              <a:rPr lang="en-US" smtClean="0"/>
+              <a:rPr lang="en-US"/>
               <a:t>Fifth level</a:t>
             </a:r>
-            <a:endParaRPr lang="en-US"/>
           </a:p>
         </p:txBody>
       </p:sp>
@@ -760,7 +757,7 @@
           <a:p>
             <a:fld id="{EE44A417-51B0-1D43-B02A-8AAFACC2C201}" type="datetimeFigureOut">
               <a:rPr lang="en-US" smtClean="0"/>
-              <a:t>4/24/18</a:t>
+              <a:t>4/21/20</a:t>
             </a:fld>
             <a:endParaRPr lang="en-US"/>
           </a:p>
@@ -863,10 +860,9 @@
           </a:lstStyle>
           <a:p>
             <a:r>
-              <a:rPr lang="en-US" smtClean="0"/>
+              <a:rPr lang="en-US"/>
               <a:t>Click to edit Master title style</a:t>
             </a:r>
-            <a:endParaRPr lang="en-US"/>
           </a:p>
         </p:txBody>
       </p:sp>
@@ -983,7 +979,7 @@
           <a:p>
             <a:pPr lvl="0"/>
             <a:r>
-              <a:rPr lang="en-US" smtClean="0"/>
+              <a:rPr lang="en-US"/>
               <a:t>Click to edit Master text styles</a:t>
             </a:r>
           </a:p>
@@ -1006,7 +1002,7 @@
           <a:p>
             <a:fld id="{EE44A417-51B0-1D43-B02A-8AAFACC2C201}" type="datetimeFigureOut">
               <a:rPr lang="en-US" smtClean="0"/>
-              <a:t>4/24/18</a:t>
+              <a:t>4/21/20</a:t>
             </a:fld>
             <a:endParaRPr lang="en-US"/>
           </a:p>
@@ -1100,10 +1096,9 @@
           <a:lstStyle/>
           <a:p>
             <a:r>
-              <a:rPr lang="en-US" smtClean="0"/>
+              <a:rPr lang="en-US"/>
               <a:t>Click to edit Master title style</a:t>
             </a:r>
-            <a:endParaRPr lang="en-US"/>
           </a:p>
         </p:txBody>
       </p:sp>
@@ -1129,38 +1124,37 @@
           <a:p>
             <a:pPr lvl="0"/>
             <a:r>
-              <a:rPr lang="en-US" smtClean="0"/>
+              <a:rPr lang="en-US"/>
               <a:t>Click to edit Master text styles</a:t>
             </a:r>
           </a:p>
           <a:p>
             <a:pPr lvl="1"/>
             <a:r>
-              <a:rPr lang="en-US" smtClean="0"/>
+              <a:rPr lang="en-US"/>
               <a:t>Second level</a:t>
             </a:r>
           </a:p>
           <a:p>
             <a:pPr lvl="2"/>
             <a:r>
-              <a:rPr lang="en-US" smtClean="0"/>
+              <a:rPr lang="en-US"/>
               <a:t>Third level</a:t>
             </a:r>
           </a:p>
           <a:p>
             <a:pPr lvl="3"/>
             <a:r>
-              <a:rPr lang="en-US" smtClean="0"/>
+              <a:rPr lang="en-US"/>
               <a:t>Fourth level</a:t>
             </a:r>
           </a:p>
           <a:p>
             <a:pPr lvl="4"/>
             <a:r>
-              <a:rPr lang="en-US" smtClean="0"/>
+              <a:rPr lang="en-US"/>
               <a:t>Fifth level</a:t>
             </a:r>
-            <a:endParaRPr lang="en-US"/>
           </a:p>
         </p:txBody>
       </p:sp>
@@ -1186,38 +1180,37 @@
           <a:p>
             <a:pPr lvl="0"/>
             <a:r>
-              <a:rPr lang="en-US" smtClean="0"/>
+              <a:rPr lang="en-US"/>
               <a:t>Click to edit Master text styles</a:t>
             </a:r>
           </a:p>
           <a:p>
             <a:pPr lvl="1"/>
             <a:r>
-              <a:rPr lang="en-US" smtClean="0"/>
+              <a:rPr lang="en-US"/>
               <a:t>Second level</a:t>
             </a:r>
           </a:p>
           <a:p>
             <a:pPr lvl="2"/>
             <a:r>
-              <a:rPr lang="en-US" smtClean="0"/>
+              <a:rPr lang="en-US"/>
               <a:t>Third level</a:t>
             </a:r>
           </a:p>
           <a:p>
             <a:pPr lvl="3"/>
             <a:r>
-              <a:rPr lang="en-US" smtClean="0"/>
+              <a:rPr lang="en-US"/>
               <a:t>Fourth level</a:t>
             </a:r>
           </a:p>
           <a:p>
             <a:pPr lvl="4"/>
             <a:r>
-              <a:rPr lang="en-US" smtClean="0"/>
+              <a:rPr lang="en-US"/>
               <a:t>Fifth level</a:t>
             </a:r>
-            <a:endParaRPr lang="en-US"/>
           </a:p>
         </p:txBody>
       </p:sp>
@@ -1238,7 +1231,7 @@
           <a:p>
             <a:fld id="{EE44A417-51B0-1D43-B02A-8AAFACC2C201}" type="datetimeFigureOut">
               <a:rPr lang="en-US" smtClean="0"/>
-              <a:t>4/24/18</a:t>
+              <a:t>4/21/20</a:t>
             </a:fld>
             <a:endParaRPr lang="en-US"/>
           </a:p>
@@ -1337,10 +1330,9 @@
           <a:lstStyle/>
           <a:p>
             <a:r>
-              <a:rPr lang="en-US" smtClean="0"/>
+              <a:rPr lang="en-US"/>
               <a:t>Click to edit Master title style</a:t>
             </a:r>
-            <a:endParaRPr lang="en-US"/>
           </a:p>
         </p:txBody>
       </p:sp>
@@ -1403,7 +1395,7 @@
           <a:p>
             <a:pPr lvl="0"/>
             <a:r>
-              <a:rPr lang="en-US" smtClean="0"/>
+              <a:rPr lang="en-US"/>
               <a:t>Click to edit Master text styles</a:t>
             </a:r>
           </a:p>
@@ -1431,38 +1423,37 @@
           <a:p>
             <a:pPr lvl="0"/>
             <a:r>
-              <a:rPr lang="en-US" smtClean="0"/>
+              <a:rPr lang="en-US"/>
               <a:t>Click to edit Master text styles</a:t>
             </a:r>
           </a:p>
           <a:p>
             <a:pPr lvl="1"/>
             <a:r>
-              <a:rPr lang="en-US" smtClean="0"/>
+              <a:rPr lang="en-US"/>
               <a:t>Second level</a:t>
             </a:r>
           </a:p>
           <a:p>
             <a:pPr lvl="2"/>
             <a:r>
-              <a:rPr lang="en-US" smtClean="0"/>
+              <a:rPr lang="en-US"/>
               <a:t>Third level</a:t>
             </a:r>
           </a:p>
           <a:p>
             <a:pPr lvl="3"/>
             <a:r>
-              <a:rPr lang="en-US" smtClean="0"/>
+              <a:rPr lang="en-US"/>
               <a:t>Fourth level</a:t>
             </a:r>
           </a:p>
           <a:p>
             <a:pPr lvl="4"/>
             <a:r>
-              <a:rPr lang="en-US" smtClean="0"/>
+              <a:rPr lang="en-US"/>
               <a:t>Fifth level</a:t>
             </a:r>
-            <a:endParaRPr lang="en-US"/>
           </a:p>
         </p:txBody>
       </p:sp>
@@ -1525,7 +1516,7 @@
           <a:p>
             <a:pPr lvl="0"/>
             <a:r>
-              <a:rPr lang="en-US" smtClean="0"/>
+              <a:rPr lang="en-US"/>
               <a:t>Click to edit Master text styles</a:t>
             </a:r>
           </a:p>
@@ -1553,38 +1544,37 @@
           <a:p>
             <a:pPr lvl="0"/>
             <a:r>
-              <a:rPr lang="en-US" smtClean="0"/>
+              <a:rPr lang="en-US"/>
               <a:t>Click to edit Master text styles</a:t>
             </a:r>
           </a:p>
           <a:p>
             <a:pPr lvl="1"/>
             <a:r>
-              <a:rPr lang="en-US" smtClean="0"/>
+              <a:rPr lang="en-US"/>
               <a:t>Second level</a:t>
             </a:r>
           </a:p>
           <a:p>
             <a:pPr lvl="2"/>
             <a:r>
-              <a:rPr lang="en-US" smtClean="0"/>
+              <a:rPr lang="en-US"/>
               <a:t>Third level</a:t>
             </a:r>
           </a:p>
           <a:p>
             <a:pPr lvl="3"/>
             <a:r>
-              <a:rPr lang="en-US" smtClean="0"/>
+              <a:rPr lang="en-US"/>
               <a:t>Fourth level</a:t>
             </a:r>
           </a:p>
           <a:p>
             <a:pPr lvl="4"/>
             <a:r>
-              <a:rPr lang="en-US" smtClean="0"/>
+              <a:rPr lang="en-US"/>
               <a:t>Fifth level</a:t>
             </a:r>
-            <a:endParaRPr lang="en-US"/>
           </a:p>
         </p:txBody>
       </p:sp>
@@ -1605,7 +1595,7 @@
           <a:p>
             <a:fld id="{EE44A417-51B0-1D43-B02A-8AAFACC2C201}" type="datetimeFigureOut">
               <a:rPr lang="en-US" smtClean="0"/>
-              <a:t>4/24/18</a:t>
+              <a:t>4/21/20</a:t>
             </a:fld>
             <a:endParaRPr lang="en-US"/>
           </a:p>
@@ -1699,10 +1689,9 @@
           <a:lstStyle/>
           <a:p>
             <a:r>
-              <a:rPr lang="en-US" smtClean="0"/>
+              <a:rPr lang="en-US"/>
               <a:t>Click to edit Master title style</a:t>
             </a:r>
-            <a:endParaRPr lang="en-US"/>
           </a:p>
         </p:txBody>
       </p:sp>
@@ -1723,7 +1712,7 @@
           <a:p>
             <a:fld id="{EE44A417-51B0-1D43-B02A-8AAFACC2C201}" type="datetimeFigureOut">
               <a:rPr lang="en-US" smtClean="0"/>
-              <a:t>4/24/18</a:t>
+              <a:t>4/21/20</a:t>
             </a:fld>
             <a:endParaRPr lang="en-US"/>
           </a:p>
@@ -1818,7 +1807,7 @@
           <a:p>
             <a:fld id="{EE44A417-51B0-1D43-B02A-8AAFACC2C201}" type="datetimeFigureOut">
               <a:rPr lang="en-US" smtClean="0"/>
-              <a:t>4/24/18</a:t>
+              <a:t>4/21/20</a:t>
             </a:fld>
             <a:endParaRPr lang="en-US"/>
           </a:p>
@@ -1921,10 +1910,9 @@
           </a:lstStyle>
           <a:p>
             <a:r>
-              <a:rPr lang="en-US" smtClean="0"/>
+              <a:rPr lang="en-US"/>
               <a:t>Click to edit Master title style</a:t>
             </a:r>
-            <a:endParaRPr lang="en-US"/>
           </a:p>
         </p:txBody>
       </p:sp>
@@ -1978,38 +1966,37 @@
           <a:p>
             <a:pPr lvl="0"/>
             <a:r>
-              <a:rPr lang="en-US" smtClean="0"/>
+              <a:rPr lang="en-US"/>
               <a:t>Click to edit Master text styles</a:t>
             </a:r>
           </a:p>
           <a:p>
             <a:pPr lvl="1"/>
             <a:r>
-              <a:rPr lang="en-US" smtClean="0"/>
+              <a:rPr lang="en-US"/>
               <a:t>Second level</a:t>
             </a:r>
           </a:p>
           <a:p>
             <a:pPr lvl="2"/>
             <a:r>
-              <a:rPr lang="en-US" smtClean="0"/>
+              <a:rPr lang="en-US"/>
               <a:t>Third level</a:t>
             </a:r>
           </a:p>
           <a:p>
             <a:pPr lvl="3"/>
             <a:r>
-              <a:rPr lang="en-US" smtClean="0"/>
+              <a:rPr lang="en-US"/>
               <a:t>Fourth level</a:t>
             </a:r>
           </a:p>
           <a:p>
             <a:pPr lvl="4"/>
             <a:r>
-              <a:rPr lang="en-US" smtClean="0"/>
+              <a:rPr lang="en-US"/>
               <a:t>Fifth level</a:t>
             </a:r>
-            <a:endParaRPr lang="en-US"/>
           </a:p>
         </p:txBody>
       </p:sp>
@@ -2072,7 +2059,7 @@
           <a:p>
             <a:pPr lvl="0"/>
             <a:r>
-              <a:rPr lang="en-US" smtClean="0"/>
+              <a:rPr lang="en-US"/>
               <a:t>Click to edit Master text styles</a:t>
             </a:r>
           </a:p>
@@ -2095,7 +2082,7 @@
           <a:p>
             <a:fld id="{EE44A417-51B0-1D43-B02A-8AAFACC2C201}" type="datetimeFigureOut">
               <a:rPr lang="en-US" smtClean="0"/>
-              <a:t>4/24/18</a:t>
+              <a:t>4/21/20</a:t>
             </a:fld>
             <a:endParaRPr lang="en-US"/>
           </a:p>
@@ -2198,10 +2185,9 @@
           </a:lstStyle>
           <a:p>
             <a:r>
-              <a:rPr lang="en-US" smtClean="0"/>
+              <a:rPr lang="en-US"/>
               <a:t>Click to edit Master title style</a:t>
             </a:r>
-            <a:endParaRPr lang="en-US"/>
           </a:p>
         </p:txBody>
       </p:sp>
@@ -2325,7 +2311,7 @@
           <a:p>
             <a:pPr lvl="0"/>
             <a:r>
-              <a:rPr lang="en-US" smtClean="0"/>
+              <a:rPr lang="en-US"/>
               <a:t>Click to edit Master text styles</a:t>
             </a:r>
           </a:p>
@@ -2348,7 +2334,7 @@
           <a:p>
             <a:fld id="{EE44A417-51B0-1D43-B02A-8AAFACC2C201}" type="datetimeFigureOut">
               <a:rPr lang="en-US" smtClean="0"/>
-              <a:t>4/24/18</a:t>
+              <a:t>4/21/20</a:t>
             </a:fld>
             <a:endParaRPr lang="en-US"/>
           </a:p>
@@ -2457,10 +2443,9 @@
           <a:lstStyle/>
           <a:p>
             <a:r>
-              <a:rPr lang="en-US" smtClean="0"/>
+              <a:rPr lang="en-US"/>
               <a:t>Click to edit Master title style</a:t>
             </a:r>
-            <a:endParaRPr lang="en-US"/>
           </a:p>
         </p:txBody>
       </p:sp>
@@ -2491,38 +2476,37 @@
           <a:p>
             <a:pPr lvl="0"/>
             <a:r>
-              <a:rPr lang="en-US" smtClean="0"/>
+              <a:rPr lang="en-US"/>
               <a:t>Click to edit Master text styles</a:t>
             </a:r>
           </a:p>
           <a:p>
             <a:pPr lvl="1"/>
             <a:r>
-              <a:rPr lang="en-US" smtClean="0"/>
+              <a:rPr lang="en-US"/>
               <a:t>Second level</a:t>
             </a:r>
           </a:p>
           <a:p>
             <a:pPr lvl="2"/>
             <a:r>
-              <a:rPr lang="en-US" smtClean="0"/>
+              <a:rPr lang="en-US"/>
               <a:t>Third level</a:t>
             </a:r>
           </a:p>
           <a:p>
             <a:pPr lvl="3"/>
             <a:r>
-              <a:rPr lang="en-US" smtClean="0"/>
+              <a:rPr lang="en-US"/>
               <a:t>Fourth level</a:t>
             </a:r>
           </a:p>
           <a:p>
             <a:pPr lvl="4"/>
             <a:r>
-              <a:rPr lang="en-US" smtClean="0"/>
+              <a:rPr lang="en-US"/>
               <a:t>Fifth level</a:t>
             </a:r>
-            <a:endParaRPr lang="en-US"/>
           </a:p>
         </p:txBody>
       </p:sp>
@@ -2561,7 +2545,7 @@
           <a:p>
             <a:fld id="{EE44A417-51B0-1D43-B02A-8AAFACC2C201}" type="datetimeFigureOut">
               <a:rPr lang="en-US" smtClean="0"/>
-              <a:t>4/24/18</a:t>
+              <a:t>4/21/20</a:t>
             </a:fld>
             <a:endParaRPr lang="en-US"/>
           </a:p>
@@ -2993,7 +2977,7 @@
               </a:spcAft>
             </a:pPr>
             <a:r>
-              <a:rPr lang="en-US" dirty="0" smtClean="0">
+              <a:rPr lang="en-US" dirty="0">
                 <a:effectLst/>
                 <a:latin typeface="Calibri" charset="0"/>
                 <a:ea typeface="Calibri" charset="0"/>
@@ -3009,7 +2993,7 @@
               </a:spcAft>
             </a:pPr>
             <a:r>
-              <a:rPr lang="en-US" dirty="0" smtClean="0">
+              <a:rPr lang="en-US" dirty="0">
                 <a:effectLst/>
                 <a:latin typeface="Calibri" charset="0"/>
                 <a:ea typeface="Calibri" charset="0"/>
@@ -3025,7 +3009,7 @@
               </a:spcAft>
             </a:pPr>
             <a:r>
-              <a:rPr lang="en-US" dirty="0" smtClean="0">
+              <a:rPr lang="en-US" dirty="0">
                 <a:effectLst/>
                 <a:latin typeface="Calibri" charset="0"/>
                 <a:ea typeface="Calibri" charset="0"/>
@@ -3041,7 +3025,7 @@
               </a:spcAft>
             </a:pPr>
             <a:r>
-              <a:rPr lang="en-US" sz="2000" i="1" dirty="0" smtClean="0">
+              <a:rPr lang="en-US" sz="2000" i="1" dirty="0">
                 <a:effectLst/>
                 <a:latin typeface="Times New Roman" charset="0"/>
                 <a:ea typeface="Times New Roman" charset="0"/>
@@ -3049,7 +3033,7 @@
               </a:rPr>
               <a:t>By the end of the course, successful students will be able to design biological studies that are statistically tractable and perform basic statistical analyses using the programming language R</a:t>
             </a:r>
-            <a:endParaRPr lang="en-US" dirty="0" smtClean="0">
+            <a:endParaRPr lang="en-US" dirty="0">
               <a:effectLst/>
               <a:latin typeface="Calibri" charset="0"/>
               <a:ea typeface="Calibri" charset="0"/>
@@ -3062,7 +3046,7 @@
                 <a:spcPts val="0"/>
               </a:spcAft>
             </a:pPr>
-            <a:endParaRPr lang="en-US" dirty="0" smtClean="0">
+            <a:endParaRPr lang="en-US" dirty="0">
               <a:effectLst/>
               <a:latin typeface="Calibri" charset="0"/>
               <a:ea typeface="Calibri" charset="0"/>
@@ -3076,7 +3060,7 @@
               </a:spcAft>
             </a:pPr>
             <a:r>
-              <a:rPr lang="en-US" dirty="0" smtClean="0">
+              <a:rPr lang="en-US" dirty="0">
                 <a:effectLst/>
                 <a:latin typeface="Calibri" charset="0"/>
                 <a:ea typeface="Calibri" charset="0"/>
@@ -3092,7 +3076,7 @@
               </a:spcAft>
             </a:pPr>
             <a:r>
-              <a:rPr lang="en-US" dirty="0" smtClean="0">
+              <a:rPr lang="en-US" dirty="0">
                 <a:effectLst/>
                 <a:latin typeface="Calibri" charset="0"/>
                 <a:ea typeface="Calibri" charset="0"/>
@@ -3108,7 +3092,7 @@
               </a:spcAft>
             </a:pPr>
             <a:r>
-              <a:rPr lang="en-US" dirty="0" smtClean="0">
+              <a:rPr lang="en-US" dirty="0">
                 <a:effectLst/>
                 <a:latin typeface="Calibri" charset="0"/>
                 <a:ea typeface="Calibri" charset="0"/>
@@ -3124,7 +3108,7 @@
               </a:spcAft>
             </a:pPr>
             <a:r>
-              <a:rPr lang="en-US" dirty="0" smtClean="0">
+              <a:rPr lang="en-US" dirty="0">
                 <a:effectLst/>
                 <a:latin typeface="Calibri" charset="0"/>
                 <a:ea typeface="Calibri" charset="0"/>
@@ -3140,7 +3124,7 @@
               </a:spcAft>
             </a:pPr>
             <a:r>
-              <a:rPr lang="en-US" dirty="0" smtClean="0">
+              <a:rPr lang="en-US" dirty="0">
                 <a:effectLst/>
                 <a:latin typeface="Calibri" charset="0"/>
                 <a:ea typeface="Calibri" charset="0"/>
@@ -3158,7 +3142,7 @@
               <a:buChar char=""/>
             </a:pPr>
             <a:r>
-              <a:rPr lang="en-US" dirty="0" smtClean="0">
+              <a:rPr lang="en-US" dirty="0">
                 <a:effectLst/>
                 <a:latin typeface="Calibri" charset="0"/>
                 <a:ea typeface="Calibri" charset="0"/>
@@ -3176,7 +3160,7 @@
               <a:buChar char=""/>
             </a:pPr>
             <a:r>
-              <a:rPr lang="en-US" dirty="0" smtClean="0">
+              <a:rPr lang="en-US" dirty="0">
                 <a:effectLst/>
                 <a:latin typeface="Calibri" charset="0"/>
                 <a:ea typeface="Calibri" charset="0"/>
@@ -3194,7 +3178,7 @@
               <a:buChar char=""/>
             </a:pPr>
             <a:r>
-              <a:rPr lang="en-US" dirty="0" smtClean="0">
+              <a:rPr lang="en-US" dirty="0">
                 <a:effectLst/>
                 <a:latin typeface="Calibri" charset="0"/>
                 <a:ea typeface="Calibri" charset="0"/>
@@ -3210,7 +3194,7 @@
               </a:spcAft>
             </a:pPr>
             <a:r>
-              <a:rPr lang="en-US" dirty="0" smtClean="0">
+              <a:rPr lang="en-US" dirty="0">
                 <a:effectLst/>
                 <a:latin typeface="Calibri" charset="0"/>
                 <a:ea typeface="Calibri" charset="0"/>
@@ -3226,7 +3210,7 @@
               </a:spcAft>
             </a:pPr>
             <a:r>
-              <a:rPr lang="en-US" dirty="0" smtClean="0">
+              <a:rPr lang="en-US" dirty="0">
                 <a:effectLst/>
                 <a:latin typeface="Calibri" charset="0"/>
                 <a:ea typeface="Calibri" charset="0"/>
@@ -3234,12 +3218,6 @@
               </a:rPr>
               <a:t> </a:t>
             </a:r>
-            <a:endParaRPr lang="en-US" dirty="0">
-              <a:effectLst/>
-              <a:latin typeface="Calibri" charset="0"/>
-              <a:ea typeface="Calibri" charset="0"/>
-              <a:cs typeface="Times New Roman" charset="0"/>
-            </a:endParaRPr>
           </a:p>
         </p:txBody>
       </p:sp>
@@ -3253,13 +3231,6 @@
   <p:clrMapOvr>
     <a:masterClrMapping/>
   </p:clrMapOvr>
-  <p:timing>
-    <p:tnLst>
-      <p:par>
-        <p:cTn id="1" dur="indefinite" restart="never" nodeType="tmRoot"/>
-      </p:par>
-    </p:tnLst>
-  </p:timing>
 </p:sld>
 </file>
 
@@ -3307,7 +3278,7 @@
               </a:spcAft>
             </a:pPr>
             <a:r>
-              <a:rPr lang="en-US" sz="2800" dirty="0" smtClean="0">
+              <a:rPr lang="en-US" sz="2800" dirty="0">
                 <a:effectLst/>
                 <a:latin typeface="Calibri" charset="0"/>
                 <a:ea typeface="Calibri" charset="0"/>
@@ -3322,7 +3293,7 @@
                 <a:spcPts val="0"/>
               </a:spcAft>
             </a:pPr>
-            <a:endParaRPr lang="en-US" sz="2800" dirty="0" smtClean="0">
+            <a:endParaRPr lang="en-US" sz="2800" dirty="0">
               <a:latin typeface="Calibri" charset="0"/>
               <a:ea typeface="Calibri" charset="0"/>
               <a:cs typeface="Times New Roman" charset="0"/>
@@ -3335,7 +3306,7 @@
               </a:spcAft>
             </a:pPr>
             <a:r>
-              <a:rPr lang="en-US" sz="2800" dirty="0" smtClean="0">
+              <a:rPr lang="en-US" sz="2800" dirty="0">
                 <a:latin typeface="Calibri" charset="0"/>
                 <a:ea typeface="Calibri" charset="0"/>
                 <a:cs typeface="Times New Roman" charset="0"/>
@@ -3350,13 +3321,80 @@
               </a:spcAft>
             </a:pPr>
             <a:r>
-              <a:rPr lang="en-US" sz="2800" dirty="0" smtClean="0">
+              <a:rPr lang="en-US" sz="2800" dirty="0">
                 <a:latin typeface="Calibri" charset="0"/>
                 <a:ea typeface="Calibri" charset="0"/>
                 <a:cs typeface="Times New Roman" charset="0"/>
               </a:rPr>
               <a:t>Convert from text to factor or back</a:t>
             </a:r>
+          </a:p>
+          <a:p>
+            <a:pPr>
+              <a:spcAft>
+                <a:spcPts val="0"/>
+              </a:spcAft>
+            </a:pPr>
+            <a:r>
+              <a:rPr lang="en-US" sz="2800" dirty="0">
+                <a:latin typeface="Calibri" charset="0"/>
+                <a:ea typeface="Calibri" charset="0"/>
+                <a:cs typeface="Times New Roman" charset="0"/>
+              </a:rPr>
+              <a:t>Make a vector or matrix</a:t>
+            </a:r>
+          </a:p>
+          <a:p>
+            <a:pPr>
+              <a:spcAft>
+                <a:spcPts val="0"/>
+              </a:spcAft>
+            </a:pPr>
+            <a:r>
+              <a:rPr lang="en-US" sz="2800" dirty="0">
+                <a:latin typeface="Calibri" charset="0"/>
+                <a:ea typeface="Calibri" charset="0"/>
+                <a:cs typeface="Times New Roman" charset="0"/>
+              </a:rPr>
+              <a:t>Make a loop</a:t>
+            </a:r>
+          </a:p>
+          <a:p>
+            <a:pPr>
+              <a:spcAft>
+                <a:spcPts val="0"/>
+              </a:spcAft>
+            </a:pPr>
+            <a:r>
+              <a:rPr lang="en-US" sz="2800" dirty="0">
+                <a:latin typeface="Calibri" charset="0"/>
+                <a:ea typeface="Calibri" charset="0"/>
+                <a:cs typeface="Times New Roman" charset="0"/>
+              </a:rPr>
+              <a:t>Subset data from a vector or matrix</a:t>
+            </a:r>
+          </a:p>
+          <a:p>
+            <a:pPr>
+              <a:spcAft>
+                <a:spcPts val="0"/>
+              </a:spcAft>
+            </a:pPr>
+            <a:r>
+              <a:rPr lang="en-US" sz="2800" dirty="0">
+                <a:latin typeface="Calibri" charset="0"/>
+                <a:ea typeface="Calibri" charset="0"/>
+                <a:cs typeface="Times New Roman" charset="0"/>
+              </a:rPr>
+              <a:t>Count occurrences in a dataset that meet some condition</a:t>
+            </a:r>
+          </a:p>
+          <a:p>
+            <a:pPr>
+              <a:spcAft>
+                <a:spcPts val="0"/>
+              </a:spcAft>
+            </a:pPr>
             <a:endParaRPr lang="en-US" sz="2800" dirty="0">
               <a:latin typeface="Calibri" charset="0"/>
               <a:ea typeface="Calibri" charset="0"/>
@@ -3370,79 +3408,7 @@
               </a:spcAft>
             </a:pPr>
             <a:r>
-              <a:rPr lang="en-US" sz="2800" dirty="0" smtClean="0">
-                <a:latin typeface="Calibri" charset="0"/>
-                <a:ea typeface="Calibri" charset="0"/>
-                <a:cs typeface="Times New Roman" charset="0"/>
-              </a:rPr>
-              <a:t>Make a vector or matrix</a:t>
-            </a:r>
-          </a:p>
-          <a:p>
-            <a:pPr>
-              <a:spcAft>
-                <a:spcPts val="0"/>
-              </a:spcAft>
-            </a:pPr>
-            <a:r>
-              <a:rPr lang="en-US" sz="2800" dirty="0" smtClean="0">
-                <a:latin typeface="Calibri" charset="0"/>
-                <a:ea typeface="Calibri" charset="0"/>
-                <a:cs typeface="Times New Roman" charset="0"/>
-              </a:rPr>
-              <a:t>Make a loop</a:t>
-            </a:r>
-          </a:p>
-          <a:p>
-            <a:pPr>
-              <a:spcAft>
-                <a:spcPts val="0"/>
-              </a:spcAft>
-            </a:pPr>
-            <a:r>
-              <a:rPr lang="en-US" sz="2800" dirty="0" smtClean="0">
-                <a:latin typeface="Calibri" charset="0"/>
-                <a:ea typeface="Calibri" charset="0"/>
-                <a:cs typeface="Times New Roman" charset="0"/>
-              </a:rPr>
-              <a:t>Subset data from a vector or matrix</a:t>
-            </a:r>
-          </a:p>
-          <a:p>
-            <a:pPr>
-              <a:spcAft>
-                <a:spcPts val="0"/>
-              </a:spcAft>
-            </a:pPr>
-            <a:r>
-              <a:rPr lang="en-US" sz="2800" dirty="0" smtClean="0">
-                <a:latin typeface="Calibri" charset="0"/>
-                <a:ea typeface="Calibri" charset="0"/>
-                <a:cs typeface="Times New Roman" charset="0"/>
-              </a:rPr>
-              <a:t>Count occurrences in a dataset that meet some condition</a:t>
-            </a:r>
-          </a:p>
-          <a:p>
-            <a:pPr>
-              <a:spcAft>
-                <a:spcPts val="0"/>
-              </a:spcAft>
-            </a:pPr>
-            <a:endParaRPr lang="en-US" sz="2800" dirty="0" smtClean="0">
-              <a:latin typeface="Calibri" charset="0"/>
-              <a:ea typeface="Calibri" charset="0"/>
-              <a:cs typeface="Times New Roman" charset="0"/>
-            </a:endParaRPr>
-          </a:p>
-          <a:p>
-            <a:pPr>
-              <a:spcAft>
-                <a:spcPts val="0"/>
-              </a:spcAft>
-            </a:pPr>
-            <a:r>
-              <a:rPr lang="en-US" sz="2800" dirty="0" smtClean="0">
+              <a:rPr lang="en-US" sz="2800" dirty="0">
                 <a:latin typeface="Calibri" charset="0"/>
                 <a:ea typeface="Calibri" charset="0"/>
                 <a:cs typeface="Times New Roman" charset="0"/>
@@ -3450,7 +3416,7 @@
               <a:t>Fearless googling things you don</a:t>
             </a:r>
             <a:r>
-              <a:rPr lang="mr-IN" sz="2800" dirty="0" smtClean="0">
+              <a:rPr lang="mr-IN" sz="2800" dirty="0">
                 <a:latin typeface="Calibri" charset="0"/>
                 <a:ea typeface="Calibri" charset="0"/>
                 <a:cs typeface="Times New Roman" charset="0"/>
@@ -3458,13 +3424,20 @@
               <a:t>’</a:t>
             </a:r>
             <a:r>
-              <a:rPr lang="en-US" sz="2800" dirty="0" smtClean="0">
+              <a:rPr lang="en-US" sz="2800" dirty="0">
                 <a:latin typeface="Calibri" charset="0"/>
                 <a:ea typeface="Calibri" charset="0"/>
                 <a:cs typeface="Times New Roman" charset="0"/>
               </a:rPr>
               <a:t>t know how to do.</a:t>
             </a:r>
+          </a:p>
+          <a:p>
+            <a:pPr>
+              <a:spcAft>
+                <a:spcPts val="0"/>
+              </a:spcAft>
+            </a:pPr>
             <a:endParaRPr lang="en-US" sz="2800" dirty="0">
               <a:latin typeface="Calibri" charset="0"/>
               <a:ea typeface="Calibri" charset="0"/>
@@ -3477,30 +3450,6 @@
                 <a:spcPts val="0"/>
               </a:spcAft>
             </a:pPr>
-            <a:endParaRPr lang="en-US" sz="2800" dirty="0" smtClean="0">
-              <a:latin typeface="Calibri" charset="0"/>
-              <a:ea typeface="Calibri" charset="0"/>
-              <a:cs typeface="Times New Roman" charset="0"/>
-            </a:endParaRPr>
-          </a:p>
-          <a:p>
-            <a:pPr>
-              <a:spcAft>
-                <a:spcPts val="0"/>
-              </a:spcAft>
-            </a:pPr>
-            <a:endParaRPr lang="en-US" sz="2800" dirty="0" smtClean="0">
-              <a:latin typeface="Calibri" charset="0"/>
-              <a:ea typeface="Calibri" charset="0"/>
-              <a:cs typeface="Times New Roman" charset="0"/>
-            </a:endParaRPr>
-          </a:p>
-          <a:p>
-            <a:pPr>
-              <a:spcAft>
-                <a:spcPts val="0"/>
-              </a:spcAft>
-            </a:pPr>
             <a:endParaRPr lang="en-US" sz="2800" dirty="0">
               <a:latin typeface="Calibri" charset="0"/>
               <a:ea typeface="Calibri" charset="0"/>
@@ -3513,18 +3462,6 @@
                 <a:spcPts val="0"/>
               </a:spcAft>
             </a:pPr>
-            <a:endParaRPr lang="en-US" sz="2800" dirty="0" smtClean="0">
-              <a:latin typeface="Calibri" charset="0"/>
-              <a:ea typeface="Calibri" charset="0"/>
-              <a:cs typeface="Times New Roman" charset="0"/>
-            </a:endParaRPr>
-          </a:p>
-          <a:p>
-            <a:pPr>
-              <a:spcAft>
-                <a:spcPts val="0"/>
-              </a:spcAft>
-            </a:pPr>
             <a:endParaRPr lang="en-US" sz="2800" dirty="0">
               <a:latin typeface="Calibri" charset="0"/>
               <a:ea typeface="Calibri" charset="0"/>
@@ -3537,7 +3474,31 @@
                 <a:spcPts val="0"/>
               </a:spcAft>
             </a:pPr>
-            <a:endParaRPr lang="en-US" sz="2800" dirty="0" smtClean="0">
+            <a:endParaRPr lang="en-US" sz="2800" dirty="0">
+              <a:latin typeface="Calibri" charset="0"/>
+              <a:ea typeface="Calibri" charset="0"/>
+              <a:cs typeface="Times New Roman" charset="0"/>
+            </a:endParaRPr>
+          </a:p>
+          <a:p>
+            <a:pPr>
+              <a:spcAft>
+                <a:spcPts val="0"/>
+              </a:spcAft>
+            </a:pPr>
+            <a:endParaRPr lang="en-US" sz="2800" dirty="0">
+              <a:latin typeface="Calibri" charset="0"/>
+              <a:ea typeface="Calibri" charset="0"/>
+              <a:cs typeface="Times New Roman" charset="0"/>
+            </a:endParaRPr>
+          </a:p>
+          <a:p>
+            <a:pPr>
+              <a:spcAft>
+                <a:spcPts val="0"/>
+              </a:spcAft>
+            </a:pPr>
+            <a:endParaRPr lang="en-US" sz="2800" dirty="0">
               <a:latin typeface="Calibri" charset="0"/>
               <a:ea typeface="Calibri" charset="0"/>
               <a:cs typeface="Times New Roman" charset="0"/>
@@ -3555,13 +3516,6 @@
   <p:clrMapOvr>
     <a:masterClrMapping/>
   </p:clrMapOvr>
-  <p:timing>
-    <p:tnLst>
-      <p:par>
-        <p:cTn id="1" dur="indefinite" restart="never" nodeType="tmRoot"/>
-      </p:par>
-    </p:tnLst>
-  </p:timing>
 </p:sld>
 </file>
 
@@ -3591,7 +3545,7 @@
         <p:spPr>
           <a:xfrm>
             <a:off x="665018" y="412790"/>
-            <a:ext cx="5334000" cy="6124754"/>
+            <a:ext cx="5334000" cy="5693866"/>
           </a:xfrm>
           <a:prstGeom prst="rect">
             <a:avLst/>
@@ -3609,7 +3563,7 @@
               </a:spcAft>
             </a:pPr>
             <a:r>
-              <a:rPr lang="en-US" sz="2800" dirty="0" smtClean="0">
+              <a:rPr lang="en-US" sz="2800" dirty="0">
                 <a:effectLst/>
                 <a:latin typeface="Calibri" charset="0"/>
                 <a:ea typeface="Calibri" charset="0"/>
@@ -3637,7 +3591,7 @@
               </a:spcAft>
             </a:pPr>
             <a:r>
-              <a:rPr lang="en-US" sz="2800" dirty="0" smtClean="0">
+              <a:rPr lang="en-US" sz="2800" dirty="0">
                 <a:latin typeface="Calibri" charset="0"/>
                 <a:ea typeface="Calibri" charset="0"/>
                 <a:cs typeface="Times New Roman" charset="0"/>
@@ -3645,7 +3599,7 @@
               <a:t>Distribution functions like norm, </a:t>
             </a:r>
             <a:r>
-              <a:rPr lang="en-US" sz="2800" dirty="0" err="1" smtClean="0">
+              <a:rPr lang="en-US" sz="2800" dirty="0" err="1">
                 <a:latin typeface="Calibri" charset="0"/>
                 <a:ea typeface="Calibri" charset="0"/>
                 <a:cs typeface="Times New Roman" charset="0"/>
@@ -3653,7 +3607,7 @@
               <a:t>binom</a:t>
             </a:r>
             <a:r>
-              <a:rPr lang="en-US" sz="2800" dirty="0" smtClean="0">
+              <a:rPr lang="en-US" sz="2800" dirty="0">
                 <a:latin typeface="Calibri" charset="0"/>
                 <a:ea typeface="Calibri" charset="0"/>
                 <a:cs typeface="Times New Roman" charset="0"/>
@@ -3667,7 +3621,7 @@
                 <a:spcPts val="0"/>
               </a:spcAft>
             </a:pPr>
-            <a:endParaRPr lang="en-US" sz="2800" dirty="0" smtClean="0">
+            <a:endParaRPr lang="en-US" sz="2800" dirty="0">
               <a:latin typeface="Calibri" charset="0"/>
               <a:ea typeface="Calibri" charset="0"/>
               <a:cs typeface="Times New Roman" charset="0"/>
@@ -3680,14 +3634,14 @@
               </a:spcAft>
             </a:pPr>
             <a:r>
-              <a:rPr lang="en-US" sz="2800" dirty="0" err="1" smtClean="0">
+              <a:rPr lang="en-US" sz="2800" dirty="0" err="1">
                 <a:latin typeface="Calibri" charset="0"/>
                 <a:ea typeface="Calibri" charset="0"/>
                 <a:cs typeface="Times New Roman" charset="0"/>
               </a:rPr>
               <a:t>binom.test</a:t>
             </a:r>
-            <a:endParaRPr lang="en-US" sz="2800" dirty="0" smtClean="0">
+            <a:endParaRPr lang="en-US" sz="2800" dirty="0">
               <a:latin typeface="Calibri" charset="0"/>
               <a:ea typeface="Calibri" charset="0"/>
               <a:cs typeface="Times New Roman" charset="0"/>
@@ -3700,14 +3654,14 @@
               </a:spcAft>
             </a:pPr>
             <a:r>
-              <a:rPr lang="en-US" sz="2800" dirty="0" err="1" smtClean="0">
+              <a:rPr lang="en-US" sz="2800" dirty="0" err="1">
                 <a:latin typeface="Calibri" charset="0"/>
                 <a:ea typeface="Calibri" charset="0"/>
                 <a:cs typeface="Times New Roman" charset="0"/>
               </a:rPr>
               <a:t>chisq.test</a:t>
             </a:r>
-            <a:endParaRPr lang="en-US" sz="2800" dirty="0" smtClean="0">
+            <a:endParaRPr lang="en-US" sz="2800" dirty="0">
               <a:latin typeface="Calibri" charset="0"/>
               <a:ea typeface="Calibri" charset="0"/>
               <a:cs typeface="Times New Roman" charset="0"/>
@@ -3715,14 +3669,14 @@
           </a:p>
           <a:p>
             <a:r>
-              <a:rPr lang="en-US" sz="2800" dirty="0" err="1" smtClean="0">
+              <a:rPr lang="en-US" sz="2800" dirty="0" err="1">
                 <a:latin typeface="Calibri" charset="0"/>
                 <a:ea typeface="Calibri" charset="0"/>
                 <a:cs typeface="Times New Roman" charset="0"/>
               </a:rPr>
               <a:t>t.test</a:t>
             </a:r>
-            <a:endParaRPr lang="en-US" sz="2800" dirty="0" smtClean="0">
+            <a:endParaRPr lang="en-US" sz="2800" dirty="0">
               <a:latin typeface="Calibri" charset="0"/>
               <a:ea typeface="Calibri" charset="0"/>
               <a:cs typeface="Times New Roman" charset="0"/>
@@ -3735,14 +3689,14 @@
               </a:spcAft>
             </a:pPr>
             <a:r>
-              <a:rPr lang="en-US" sz="2800" dirty="0" err="1" smtClean="0">
+              <a:rPr lang="en-US" sz="2800" dirty="0" err="1">
                 <a:latin typeface="Calibri" charset="0"/>
                 <a:ea typeface="Calibri" charset="0"/>
                 <a:cs typeface="Times New Roman" charset="0"/>
               </a:rPr>
               <a:t>leveneTest</a:t>
             </a:r>
-            <a:endParaRPr lang="en-US" sz="2800" dirty="0" smtClean="0">
+            <a:endParaRPr lang="en-US" sz="2800" dirty="0">
               <a:latin typeface="Calibri" charset="0"/>
               <a:ea typeface="Calibri" charset="0"/>
               <a:cs typeface="Times New Roman" charset="0"/>
@@ -3755,33 +3709,18 @@
               </a:spcAft>
             </a:pPr>
             <a:r>
-              <a:rPr lang="en-US" sz="2800" dirty="0" err="1" smtClean="0">
-                <a:latin typeface="Calibri" charset="0"/>
-                <a:ea typeface="Calibri" charset="0"/>
-                <a:cs typeface="Times New Roman" charset="0"/>
-              </a:rPr>
-              <a:t>shapiro.test</a:t>
-            </a:r>
-            <a:endParaRPr lang="en-US" sz="2800" dirty="0" smtClean="0">
-              <a:latin typeface="Calibri" charset="0"/>
-              <a:ea typeface="Calibri" charset="0"/>
-              <a:cs typeface="Times New Roman" charset="0"/>
-            </a:endParaRPr>
-          </a:p>
-          <a:p>
-            <a:pPr>
-              <a:spcAft>
-                <a:spcPts val="0"/>
-              </a:spcAft>
-            </a:pPr>
-            <a:r>
-              <a:rPr lang="en-US" sz="2800" dirty="0" smtClean="0">
+              <a:rPr lang="en-US" sz="2800" dirty="0" err="1">
                 <a:latin typeface="Calibri" charset="0"/>
                 <a:ea typeface="Calibri" charset="0"/>
                 <a:cs typeface="Times New Roman" charset="0"/>
               </a:rPr>
               <a:t>lm</a:t>
             </a:r>
+            <a:endParaRPr lang="en-US" sz="2800" dirty="0">
+              <a:latin typeface="Calibri" charset="0"/>
+              <a:ea typeface="Calibri" charset="0"/>
+              <a:cs typeface="Times New Roman" charset="0"/>
+            </a:endParaRPr>
           </a:p>
         </p:txBody>
       </p:sp>
@@ -3812,14 +3751,14 @@
               </a:spcAft>
             </a:pPr>
             <a:r>
-              <a:rPr lang="en-US" sz="2800" dirty="0" err="1" smtClean="0">
+              <a:rPr lang="en-US" sz="2800" dirty="0" err="1">
                 <a:latin typeface="Calibri" charset="0"/>
                 <a:ea typeface="Calibri" charset="0"/>
                 <a:cs typeface="Times New Roman" charset="0"/>
               </a:rPr>
               <a:t>aov</a:t>
             </a:r>
-            <a:endParaRPr lang="en-US" sz="2800" dirty="0" smtClean="0">
+            <a:endParaRPr lang="en-US" sz="2800" dirty="0">
               <a:latin typeface="Calibri" charset="0"/>
               <a:ea typeface="Calibri" charset="0"/>
               <a:cs typeface="Times New Roman" charset="0"/>
@@ -3832,14 +3771,14 @@
               </a:spcAft>
             </a:pPr>
             <a:r>
-              <a:rPr lang="en-US" sz="2800" dirty="0" err="1" smtClean="0">
+              <a:rPr lang="en-US" sz="2800" dirty="0" err="1">
                 <a:latin typeface="Calibri" charset="0"/>
                 <a:ea typeface="Calibri" charset="0"/>
                 <a:cs typeface="Times New Roman" charset="0"/>
               </a:rPr>
               <a:t>anova</a:t>
             </a:r>
-            <a:endParaRPr lang="en-US" sz="2800" dirty="0" smtClean="0">
+            <a:endParaRPr lang="en-US" sz="2800" dirty="0">
               <a:latin typeface="Calibri" charset="0"/>
               <a:ea typeface="Calibri" charset="0"/>
               <a:cs typeface="Times New Roman" charset="0"/>
@@ -3852,14 +3791,14 @@
               </a:spcAft>
             </a:pPr>
             <a:r>
-              <a:rPr lang="en-US" sz="2800" dirty="0" err="1" smtClean="0">
+              <a:rPr lang="en-US" sz="2800" dirty="0" err="1">
                 <a:latin typeface="Calibri" charset="0"/>
                 <a:ea typeface="Calibri" charset="0"/>
                 <a:cs typeface="Times New Roman" charset="0"/>
               </a:rPr>
               <a:t>TukeyHSD</a:t>
             </a:r>
-            <a:endParaRPr lang="en-US" sz="2800" dirty="0" smtClean="0">
+            <a:endParaRPr lang="en-US" sz="2800" dirty="0">
               <a:latin typeface="Calibri" charset="0"/>
               <a:ea typeface="Calibri" charset="0"/>
               <a:cs typeface="Times New Roman" charset="0"/>
@@ -3872,14 +3811,14 @@
               </a:spcAft>
             </a:pPr>
             <a:r>
-              <a:rPr lang="en-US" sz="2800" dirty="0" err="1" smtClean="0">
+              <a:rPr lang="en-US" sz="2800" dirty="0" err="1">
                 <a:latin typeface="Calibri" charset="0"/>
                 <a:ea typeface="Calibri" charset="0"/>
                 <a:cs typeface="Times New Roman" charset="0"/>
               </a:rPr>
               <a:t>kruskal.test</a:t>
             </a:r>
-            <a:endParaRPr lang="en-US" sz="2800" dirty="0" smtClean="0">
+            <a:endParaRPr lang="en-US" sz="2800" dirty="0">
               <a:latin typeface="Calibri" charset="0"/>
               <a:ea typeface="Calibri" charset="0"/>
               <a:cs typeface="Times New Roman" charset="0"/>
@@ -3892,14 +3831,14 @@
               </a:spcAft>
             </a:pPr>
             <a:r>
-              <a:rPr lang="en-US" sz="2800" dirty="0" err="1" smtClean="0">
+              <a:rPr lang="en-US" sz="2800" dirty="0" err="1">
                 <a:latin typeface="Calibri" charset="0"/>
                 <a:ea typeface="Calibri" charset="0"/>
                 <a:cs typeface="Times New Roman" charset="0"/>
               </a:rPr>
               <a:t>dunn.test</a:t>
             </a:r>
-            <a:endParaRPr lang="en-US" sz="2800" dirty="0" smtClean="0">
+            <a:endParaRPr lang="en-US" sz="2800" dirty="0">
               <a:latin typeface="Calibri" charset="0"/>
               <a:ea typeface="Calibri" charset="0"/>
               <a:cs typeface="Times New Roman" charset="0"/>
@@ -3912,14 +3851,14 @@
               </a:spcAft>
             </a:pPr>
             <a:r>
-              <a:rPr lang="en-US" sz="2800" dirty="0" err="1" smtClean="0">
+              <a:rPr lang="en-US" sz="2800" dirty="0" err="1">
                 <a:latin typeface="Calibri" charset="0"/>
                 <a:ea typeface="Calibri" charset="0"/>
                 <a:cs typeface="Times New Roman" charset="0"/>
               </a:rPr>
               <a:t>cor.test</a:t>
             </a:r>
-            <a:endParaRPr lang="en-US" sz="2800" dirty="0" smtClean="0">
+            <a:endParaRPr lang="en-US" sz="2800" dirty="0">
               <a:latin typeface="Calibri" charset="0"/>
               <a:ea typeface="Calibri" charset="0"/>
               <a:cs typeface="Times New Roman" charset="0"/>
@@ -3932,14 +3871,14 @@
               </a:spcAft>
             </a:pPr>
             <a:r>
-              <a:rPr lang="en-US" sz="2800" dirty="0" err="1" smtClean="0">
+              <a:rPr lang="en-US" sz="2800" dirty="0" err="1">
                 <a:latin typeface="Calibri" charset="0"/>
                 <a:ea typeface="Calibri" charset="0"/>
                 <a:cs typeface="Times New Roman" charset="0"/>
               </a:rPr>
               <a:t>glm</a:t>
             </a:r>
-            <a:endParaRPr lang="en-US" sz="2800" dirty="0" smtClean="0">
+            <a:endParaRPr lang="en-US" sz="2800" dirty="0">
               <a:latin typeface="Calibri" charset="0"/>
               <a:ea typeface="Calibri" charset="0"/>
               <a:cs typeface="Times New Roman" charset="0"/>
@@ -3952,14 +3891,14 @@
               </a:spcAft>
             </a:pPr>
             <a:r>
-              <a:rPr lang="en-US" sz="2800" dirty="0" err="1" smtClean="0">
+              <a:rPr lang="en-US" sz="2800" dirty="0" err="1">
                 <a:latin typeface="Calibri" charset="0"/>
                 <a:ea typeface="Calibri" charset="0"/>
                 <a:cs typeface="Times New Roman" charset="0"/>
               </a:rPr>
               <a:t>lme</a:t>
             </a:r>
-            <a:endParaRPr lang="en-US" sz="2800" dirty="0" smtClean="0">
+            <a:endParaRPr lang="en-US" sz="2800" dirty="0">
               <a:latin typeface="Calibri" charset="0"/>
               <a:ea typeface="Calibri" charset="0"/>
               <a:cs typeface="Times New Roman" charset="0"/>
@@ -3972,14 +3911,14 @@
               </a:spcAft>
             </a:pPr>
             <a:r>
-              <a:rPr lang="en-US" sz="2800" dirty="0" err="1" smtClean="0">
+              <a:rPr lang="en-US" sz="2800" dirty="0" err="1">
                 <a:latin typeface="Calibri" charset="0"/>
                 <a:ea typeface="Calibri" charset="0"/>
                 <a:cs typeface="Times New Roman" charset="0"/>
               </a:rPr>
               <a:t>prcomp</a:t>
             </a:r>
-            <a:endParaRPr lang="en-US" sz="2800" dirty="0" smtClean="0">
+            <a:endParaRPr lang="en-US" sz="2800" dirty="0">
               <a:latin typeface="Calibri" charset="0"/>
               <a:ea typeface="Calibri" charset="0"/>
               <a:cs typeface="Times New Roman" charset="0"/>
@@ -3997,13 +3936,6 @@
   <p:clrMapOvr>
     <a:masterClrMapping/>
   </p:clrMapOvr>
-  <p:timing>
-    <p:tnLst>
-      <p:par>
-        <p:cTn id="1" dur="indefinite" restart="never" nodeType="tmRoot"/>
-      </p:par>
-    </p:tnLst>
-  </p:timing>
 </p:sld>
 </file>
 

</xml_diff>